<commit_message>
tijdschriftformulier & powerpoint demo
</commit_message>
<xml_diff>
--- a/Documenten/Demo 2  Powerpoint.pptx
+++ b/Documenten/Demo 2  Powerpoint.pptx
@@ -301,7 +301,7 @@
           <a:p>
             <a:fld id="{E7DBF5F4-28E2-459E-B733-48244069A2BD}" type="datetimeFigureOut">
               <a:rPr lang="nl-NL" smtClean="0"/>
-              <a:t>3-12-2020</a:t>
+              <a:t>4-12-2020</a:t>
             </a:fld>
             <a:endParaRPr lang="nl-NL"/>
           </a:p>
@@ -576,7 +576,7 @@
           <a:p>
             <a:fld id="{E7DBF5F4-28E2-459E-B733-48244069A2BD}" type="datetimeFigureOut">
               <a:rPr lang="nl-NL" smtClean="0"/>
-              <a:t>3-12-2020</a:t>
+              <a:t>4-12-2020</a:t>
             </a:fld>
             <a:endParaRPr lang="nl-NL"/>
           </a:p>
@@ -770,7 +770,7 @@
           <a:p>
             <a:fld id="{E7DBF5F4-28E2-459E-B733-48244069A2BD}" type="datetimeFigureOut">
               <a:rPr lang="nl-NL" smtClean="0"/>
-              <a:t>3-12-2020</a:t>
+              <a:t>4-12-2020</a:t>
             </a:fld>
             <a:endParaRPr lang="nl-NL"/>
           </a:p>
@@ -1038,7 +1038,7 @@
           <a:p>
             <a:fld id="{E7DBF5F4-28E2-459E-B733-48244069A2BD}" type="datetimeFigureOut">
               <a:rPr lang="nl-NL" smtClean="0"/>
-              <a:t>3-12-2020</a:t>
+              <a:t>4-12-2020</a:t>
             </a:fld>
             <a:endParaRPr lang="nl-NL"/>
           </a:p>
@@ -1370,7 +1370,7 @@
           <a:p>
             <a:fld id="{E7DBF5F4-28E2-459E-B733-48244069A2BD}" type="datetimeFigureOut">
               <a:rPr lang="nl-NL" smtClean="0"/>
-              <a:t>3-12-2020</a:t>
+              <a:t>4-12-2020</a:t>
             </a:fld>
             <a:endParaRPr lang="nl-NL"/>
           </a:p>
@@ -1980,7 +1980,7 @@
           <a:p>
             <a:fld id="{E7DBF5F4-28E2-459E-B733-48244069A2BD}" type="datetimeFigureOut">
               <a:rPr lang="nl-NL" smtClean="0"/>
-              <a:t>3-12-2020</a:t>
+              <a:t>4-12-2020</a:t>
             </a:fld>
             <a:endParaRPr lang="nl-NL"/>
           </a:p>
@@ -2827,7 +2827,7 @@
           <a:p>
             <a:fld id="{E7DBF5F4-28E2-459E-B733-48244069A2BD}" type="datetimeFigureOut">
               <a:rPr lang="nl-NL" smtClean="0"/>
-              <a:t>3-12-2020</a:t>
+              <a:t>4-12-2020</a:t>
             </a:fld>
             <a:endParaRPr lang="nl-NL"/>
           </a:p>
@@ -2997,7 +2997,7 @@
           <a:p>
             <a:fld id="{E7DBF5F4-28E2-459E-B733-48244069A2BD}" type="datetimeFigureOut">
               <a:rPr lang="nl-NL" smtClean="0"/>
-              <a:t>3-12-2020</a:t>
+              <a:t>4-12-2020</a:t>
             </a:fld>
             <a:endParaRPr lang="nl-NL"/>
           </a:p>
@@ -3177,7 +3177,7 @@
           <a:p>
             <a:fld id="{E7DBF5F4-28E2-459E-B733-48244069A2BD}" type="datetimeFigureOut">
               <a:rPr lang="nl-NL" smtClean="0"/>
-              <a:t>3-12-2020</a:t>
+              <a:t>4-12-2020</a:t>
             </a:fld>
             <a:endParaRPr lang="nl-NL"/>
           </a:p>
@@ -3347,7 +3347,7 @@
           <a:p>
             <a:fld id="{E7DBF5F4-28E2-459E-B733-48244069A2BD}" type="datetimeFigureOut">
               <a:rPr lang="nl-NL" smtClean="0"/>
-              <a:t>3-12-2020</a:t>
+              <a:t>4-12-2020</a:t>
             </a:fld>
             <a:endParaRPr lang="nl-NL"/>
           </a:p>
@@ -3591,7 +3591,7 @@
           <a:p>
             <a:fld id="{E7DBF5F4-28E2-459E-B733-48244069A2BD}" type="datetimeFigureOut">
               <a:rPr lang="nl-NL" smtClean="0"/>
-              <a:t>3-12-2020</a:t>
+              <a:t>4-12-2020</a:t>
             </a:fld>
             <a:endParaRPr lang="nl-NL"/>
           </a:p>
@@ -3883,7 +3883,7 @@
           <a:p>
             <a:fld id="{E7DBF5F4-28E2-459E-B733-48244069A2BD}" type="datetimeFigureOut">
               <a:rPr lang="nl-NL" smtClean="0"/>
-              <a:t>3-12-2020</a:t>
+              <a:t>4-12-2020</a:t>
             </a:fld>
             <a:endParaRPr lang="nl-NL"/>
           </a:p>
@@ -4321,7 +4321,7 @@
           <a:p>
             <a:fld id="{E7DBF5F4-28E2-459E-B733-48244069A2BD}" type="datetimeFigureOut">
               <a:rPr lang="nl-NL" smtClean="0"/>
-              <a:t>3-12-2020</a:t>
+              <a:t>4-12-2020</a:t>
             </a:fld>
             <a:endParaRPr lang="nl-NL"/>
           </a:p>
@@ -4439,7 +4439,7 @@
           <a:p>
             <a:fld id="{E7DBF5F4-28E2-459E-B733-48244069A2BD}" type="datetimeFigureOut">
               <a:rPr lang="nl-NL" smtClean="0"/>
-              <a:t>3-12-2020</a:t>
+              <a:t>4-12-2020</a:t>
             </a:fld>
             <a:endParaRPr lang="nl-NL"/>
           </a:p>
@@ -4534,7 +4534,7 @@
           <a:p>
             <a:fld id="{E7DBF5F4-28E2-459E-B733-48244069A2BD}" type="datetimeFigureOut">
               <a:rPr lang="nl-NL" smtClean="0"/>
-              <a:t>3-12-2020</a:t>
+              <a:t>4-12-2020</a:t>
             </a:fld>
             <a:endParaRPr lang="nl-NL"/>
           </a:p>
@@ -4813,7 +4813,7 @@
           <a:p>
             <a:fld id="{E7DBF5F4-28E2-459E-B733-48244069A2BD}" type="datetimeFigureOut">
               <a:rPr lang="nl-NL" smtClean="0"/>
-              <a:t>3-12-2020</a:t>
+              <a:t>4-12-2020</a:t>
             </a:fld>
             <a:endParaRPr lang="nl-NL"/>
           </a:p>
@@ -5088,7 +5088,7 @@
           <a:p>
             <a:fld id="{E7DBF5F4-28E2-459E-B733-48244069A2BD}" type="datetimeFigureOut">
               <a:rPr lang="nl-NL" smtClean="0"/>
-              <a:t>3-12-2020</a:t>
+              <a:t>4-12-2020</a:t>
             </a:fld>
             <a:endParaRPr lang="nl-NL"/>
           </a:p>
@@ -5517,7 +5517,7 @@
           <a:p>
             <a:fld id="{E7DBF5F4-28E2-459E-B733-48244069A2BD}" type="datetimeFigureOut">
               <a:rPr lang="nl-NL" smtClean="0"/>
-              <a:t>3-12-2020</a:t>
+              <a:t>4-12-2020</a:t>
             </a:fld>
             <a:endParaRPr lang="nl-NL"/>
           </a:p>
@@ -7203,7 +7203,7 @@
           <p:nvPr>
             <p:extLst>
               <p:ext uri="{D42A27DB-BD31-4B8C-83A1-F6EECF244321}">
-                <p14:modId xmlns:p14="http://schemas.microsoft.com/office/powerpoint/2010/main" val="2117519089"/>
+                <p14:modId xmlns:p14="http://schemas.microsoft.com/office/powerpoint/2010/main" val="3754648685"/>
               </p:ext>
             </p:extLst>
           </p:nvPr>
@@ -7335,7 +7335,7 @@
                     <a:p>
                       <a:r>
                         <a:rPr lang="nl-NL" dirty="0"/>
-                        <a:t>36,3 uur</a:t>
+                        <a:t>64,25 uur</a:t>
                       </a:r>
                     </a:p>
                   </a:txBody>
@@ -7348,7 +7348,7 @@
                     <a:p>
                       <a:r>
                         <a:rPr lang="nl-NL" dirty="0"/>
-                        <a:t>43,3 uur</a:t>
+                        <a:t>76,92 uur </a:t>
                       </a:r>
                     </a:p>
                   </a:txBody>
@@ -7361,7 +7361,7 @@
                     <a:p>
                       <a:r>
                         <a:rPr lang="nl-NL" dirty="0"/>
-                        <a:t>47,6 uur</a:t>
+                        <a:t>86,67 uur</a:t>
                       </a:r>
                     </a:p>
                   </a:txBody>
@@ -7374,7 +7374,7 @@
                     <a:p>
                       <a:r>
                         <a:rPr lang="nl-NL" dirty="0"/>
-                        <a:t>37,3 uur</a:t>
+                        <a:t>64,75 uur</a:t>
                       </a:r>
                     </a:p>
                   </a:txBody>
@@ -7387,7 +7387,7 @@
                     <a:p>
                       <a:r>
                         <a:rPr lang="nl-NL" dirty="0"/>
-                        <a:t>52,4 uur</a:t>
+                        <a:t>95,08 uur</a:t>
                       </a:r>
                     </a:p>
                   </a:txBody>
@@ -7437,6 +7437,292 @@
           </a:p>
         </p:txBody>
       </p:sp>
+      <p:sp>
+        <p:nvSpPr>
+          <p:cNvPr id="4" name="Tekstvak 3">
+            <a:extLst>
+              <a:ext uri="{FF2B5EF4-FFF2-40B4-BE49-F238E27FC236}">
+                <a16:creationId xmlns:a16="http://schemas.microsoft.com/office/drawing/2014/main" id="{DAF28647-DF33-4387-8644-FCBB1377372F}"/>
+              </a:ext>
+            </a:extLst>
+          </p:cNvPr>
+          <p:cNvSpPr txBox="1"/>
+          <p:nvPr/>
+        </p:nvSpPr>
+        <p:spPr>
+          <a:xfrm>
+            <a:off x="1724527" y="2286000"/>
+            <a:ext cx="1431802" cy="369332"/>
+          </a:xfrm>
+          <a:prstGeom prst="rect">
+            <a:avLst/>
+          </a:prstGeom>
+          <a:noFill/>
+        </p:spPr>
+        <p:txBody>
+          <a:bodyPr wrap="none" rtlCol="0">
+            <a:spAutoFit/>
+          </a:bodyPr>
+          <a:lstStyle/>
+          <a:p>
+            <a:r>
+              <a:rPr lang="nl-NL" dirty="0"/>
+              <a:t>Totale uren</a:t>
+            </a:r>
+          </a:p>
+        </p:txBody>
+      </p:sp>
+      <p:sp>
+        <p:nvSpPr>
+          <p:cNvPr id="7" name="Tekstvak 6">
+            <a:extLst>
+              <a:ext uri="{FF2B5EF4-FFF2-40B4-BE49-F238E27FC236}">
+                <a16:creationId xmlns:a16="http://schemas.microsoft.com/office/drawing/2014/main" id="{6AD12076-88DE-49E9-9502-9556DE788E04}"/>
+              </a:ext>
+            </a:extLst>
+          </p:cNvPr>
+          <p:cNvSpPr txBox="1"/>
+          <p:nvPr/>
+        </p:nvSpPr>
+        <p:spPr>
+          <a:xfrm>
+            <a:off x="1724527" y="3833337"/>
+            <a:ext cx="1963999" cy="369332"/>
+          </a:xfrm>
+          <a:prstGeom prst="rect">
+            <a:avLst/>
+          </a:prstGeom>
+          <a:noFill/>
+        </p:spPr>
+        <p:txBody>
+          <a:bodyPr wrap="none" rtlCol="0">
+            <a:spAutoFit/>
+          </a:bodyPr>
+          <a:lstStyle/>
+          <a:p>
+            <a:r>
+              <a:rPr lang="nl-NL" dirty="0"/>
+              <a:t>Uren deze sprint</a:t>
+            </a:r>
+          </a:p>
+        </p:txBody>
+      </p:sp>
+      <p:graphicFrame>
+        <p:nvGraphicFramePr>
+          <p:cNvPr id="10" name="Tabel 8">
+            <a:extLst>
+              <a:ext uri="{FF2B5EF4-FFF2-40B4-BE49-F238E27FC236}">
+                <a16:creationId xmlns:a16="http://schemas.microsoft.com/office/drawing/2014/main" id="{9E89ADEA-E6AB-47FB-B023-A8981977369D}"/>
+              </a:ext>
+            </a:extLst>
+          </p:cNvPr>
+          <p:cNvGraphicFramePr>
+            <a:graphicFrameLocks noGrp="1"/>
+          </p:cNvGraphicFramePr>
+          <p:nvPr>
+            <p:extLst>
+              <p:ext uri="{D42A27DB-BD31-4B8C-83A1-F6EECF244321}">
+                <p14:modId xmlns:p14="http://schemas.microsoft.com/office/powerpoint/2010/main" val="1693937880"/>
+              </p:ext>
+            </p:extLst>
+          </p:nvPr>
+        </p:nvGraphicFramePr>
+        <p:xfrm>
+          <a:off x="1781016" y="4293884"/>
+          <a:ext cx="8629965" cy="1010920"/>
+        </p:xfrm>
+        <a:graphic>
+          <a:graphicData uri="http://schemas.openxmlformats.org/drawingml/2006/table">
+            <a:tbl>
+              <a:tblPr firstRow="1" bandRow="1">
+                <a:tableStyleId>{5C22544A-7EE6-4342-B048-85BDC9FD1C3A}</a:tableStyleId>
+              </a:tblPr>
+              <a:tblGrid>
+                <a:gridCol w="1725993">
+                  <a:extLst>
+                    <a:ext uri="{9D8B030D-6E8A-4147-A177-3AD203B41FA5}">
+                      <a16:colId xmlns:a16="http://schemas.microsoft.com/office/drawing/2014/main" val="2151106321"/>
+                    </a:ext>
+                  </a:extLst>
+                </a:gridCol>
+                <a:gridCol w="1725993">
+                  <a:extLst>
+                    <a:ext uri="{9D8B030D-6E8A-4147-A177-3AD203B41FA5}">
+                      <a16:colId xmlns:a16="http://schemas.microsoft.com/office/drawing/2014/main" val="3078863484"/>
+                    </a:ext>
+                  </a:extLst>
+                </a:gridCol>
+                <a:gridCol w="1725993">
+                  <a:extLst>
+                    <a:ext uri="{9D8B030D-6E8A-4147-A177-3AD203B41FA5}">
+                      <a16:colId xmlns:a16="http://schemas.microsoft.com/office/drawing/2014/main" val="3998661384"/>
+                    </a:ext>
+                  </a:extLst>
+                </a:gridCol>
+                <a:gridCol w="1725993">
+                  <a:extLst>
+                    <a:ext uri="{9D8B030D-6E8A-4147-A177-3AD203B41FA5}">
+                      <a16:colId xmlns:a16="http://schemas.microsoft.com/office/drawing/2014/main" val="3106724828"/>
+                    </a:ext>
+                  </a:extLst>
+                </a:gridCol>
+                <a:gridCol w="1725993">
+                  <a:extLst>
+                    <a:ext uri="{9D8B030D-6E8A-4147-A177-3AD203B41FA5}">
+                      <a16:colId xmlns:a16="http://schemas.microsoft.com/office/drawing/2014/main" val="1178952609"/>
+                    </a:ext>
+                  </a:extLst>
+                </a:gridCol>
+              </a:tblGrid>
+              <a:tr h="417950">
+                <a:tc>
+                  <a:txBody>
+                    <a:bodyPr/>
+                    <a:lstStyle/>
+                    <a:p>
+                      <a:r>
+                        <a:rPr lang="nl-NL" dirty="0"/>
+                        <a:t>Jeremy Vermeulen</a:t>
+                      </a:r>
+                    </a:p>
+                  </a:txBody>
+                  <a:tcPr/>
+                </a:tc>
+                <a:tc>
+                  <a:txBody>
+                    <a:bodyPr/>
+                    <a:lstStyle/>
+                    <a:p>
+                      <a:r>
+                        <a:rPr lang="nl-NL" dirty="0"/>
+                        <a:t>Jan Willem Grimme</a:t>
+                      </a:r>
+                    </a:p>
+                  </a:txBody>
+                  <a:tcPr/>
+                </a:tc>
+                <a:tc>
+                  <a:txBody>
+                    <a:bodyPr/>
+                    <a:lstStyle/>
+                    <a:p>
+                      <a:r>
+                        <a:rPr lang="nl-NL" dirty="0"/>
+                        <a:t>Jasper in ‘t Veld</a:t>
+                      </a:r>
+                    </a:p>
+                  </a:txBody>
+                  <a:tcPr/>
+                </a:tc>
+                <a:tc>
+                  <a:txBody>
+                    <a:bodyPr/>
+                    <a:lstStyle/>
+                    <a:p>
+                      <a:r>
+                        <a:rPr lang="nl-NL" dirty="0"/>
+                        <a:t>Roy Schottert</a:t>
+                      </a:r>
+                    </a:p>
+                  </a:txBody>
+                  <a:tcPr/>
+                </a:tc>
+                <a:tc>
+                  <a:txBody>
+                    <a:bodyPr/>
+                    <a:lstStyle/>
+                    <a:p>
+                      <a:r>
+                        <a:rPr lang="nl-NL" dirty="0"/>
+                        <a:t>Ivar Post</a:t>
+                      </a:r>
+                    </a:p>
+                  </a:txBody>
+                  <a:tcPr/>
+                </a:tc>
+                <a:extLst>
+                  <a:ext uri="{0D108BD9-81ED-4DB2-BD59-A6C34878D82A}">
+                    <a16:rowId xmlns:a16="http://schemas.microsoft.com/office/drawing/2014/main" val="3991137764"/>
+                  </a:ext>
+                </a:extLst>
+              </a:tr>
+              <a:tr h="370840">
+                <a:tc>
+                  <a:txBody>
+                    <a:bodyPr/>
+                    <a:lstStyle/>
+                    <a:p>
+                      <a:r>
+                        <a:rPr lang="nl-NL" dirty="0"/>
+                        <a:t>23,91 uur</a:t>
+                      </a:r>
+                    </a:p>
+                  </a:txBody>
+                  <a:tcPr/>
+                </a:tc>
+                <a:tc>
+                  <a:txBody>
+                    <a:bodyPr/>
+                    <a:lstStyle/>
+                    <a:p>
+                      <a:r>
+                        <a:rPr lang="nl-NL" dirty="0"/>
+                        <a:t>30,09 uur</a:t>
+                      </a:r>
+                    </a:p>
+                  </a:txBody>
+                  <a:tcPr/>
+                </a:tc>
+                <a:tc>
+                  <a:txBody>
+                    <a:bodyPr/>
+                    <a:lstStyle/>
+                    <a:p>
+                      <a:r>
+                        <a:rPr lang="nl-NL" dirty="0"/>
+                        <a:t>35,5 uur </a:t>
+                      </a:r>
+                    </a:p>
+                  </a:txBody>
+                  <a:tcPr/>
+                </a:tc>
+                <a:tc>
+                  <a:txBody>
+                    <a:bodyPr/>
+                    <a:lstStyle/>
+                    <a:p>
+                      <a:r>
+                        <a:rPr lang="nl-NL" dirty="0"/>
+                        <a:t>23,92 uur</a:t>
+                      </a:r>
+                    </a:p>
+                  </a:txBody>
+                  <a:tcPr/>
+                </a:tc>
+                <a:tc>
+                  <a:txBody>
+                    <a:bodyPr/>
+                    <a:lstStyle/>
+                    <a:p>
+                      <a:r>
+                        <a:rPr lang="nl-NL"/>
+                        <a:t>37,67 uur</a:t>
+                      </a:r>
+                      <a:endParaRPr lang="nl-NL" dirty="0"/>
+                    </a:p>
+                  </a:txBody>
+                  <a:tcPr/>
+                </a:tc>
+                <a:extLst>
+                  <a:ext uri="{0D108BD9-81ED-4DB2-BD59-A6C34878D82A}">
+                    <a16:rowId xmlns:a16="http://schemas.microsoft.com/office/drawing/2014/main" val="2485646841"/>
+                  </a:ext>
+                </a:extLst>
+              </a:tr>
+            </a:tbl>
+          </a:graphicData>
+        </a:graphic>
+      </p:graphicFrame>
     </p:spTree>
     <p:extLst>
       <p:ext uri="{BB962C8B-B14F-4D97-AF65-F5344CB8AC3E}">

</xml_diff>